<commit_message>
Report on Electrical Characterisation is ready (only to delete the comments in the table in the beginning) and is sent to Ilaria, now I am preparing the report on the X-Ray measurements
</commit_message>
<xml_diff>
--- a/Mikhail Bandurist Transistors/Batch2_Electrical_Characterisation/Batch 002 20231023 low v2 (Geom Params from Adrian).pptx
+++ b/Mikhail Bandurist Transistors/Batch2_Electrical_Characterisation/Batch 002 20231023 low v2 (Geom Params from Adrian).pptx
@@ -282,7 +282,7 @@
           <a:p>
             <a:fld id="{39F74F40-967F-46B7-9595-DA9C60B09F55}" type="datetimeFigureOut">
               <a:rPr lang="en-GB" smtClean="0"/>
-              <a:t>06/11/2023</a:t>
+              <a:t>06/12/2023</a:t>
             </a:fld>
             <a:endParaRPr lang="en-GB"/>
           </a:p>
@@ -480,7 +480,7 @@
           <a:p>
             <a:fld id="{39F74F40-967F-46B7-9595-DA9C60B09F55}" type="datetimeFigureOut">
               <a:rPr lang="en-GB" smtClean="0"/>
-              <a:t>06/11/2023</a:t>
+              <a:t>06/12/2023</a:t>
             </a:fld>
             <a:endParaRPr lang="en-GB"/>
           </a:p>
@@ -688,7 +688,7 @@
           <a:p>
             <a:fld id="{39F74F40-967F-46B7-9595-DA9C60B09F55}" type="datetimeFigureOut">
               <a:rPr lang="en-GB" smtClean="0"/>
-              <a:t>06/11/2023</a:t>
+              <a:t>06/12/2023</a:t>
             </a:fld>
             <a:endParaRPr lang="en-GB"/>
           </a:p>
@@ -886,7 +886,7 @@
           <a:p>
             <a:fld id="{39F74F40-967F-46B7-9595-DA9C60B09F55}" type="datetimeFigureOut">
               <a:rPr lang="en-GB" smtClean="0"/>
-              <a:t>06/11/2023</a:t>
+              <a:t>06/12/2023</a:t>
             </a:fld>
             <a:endParaRPr lang="en-GB"/>
           </a:p>
@@ -1161,7 +1161,7 @@
           <a:p>
             <a:fld id="{39F74F40-967F-46B7-9595-DA9C60B09F55}" type="datetimeFigureOut">
               <a:rPr lang="en-GB" smtClean="0"/>
-              <a:t>06/11/2023</a:t>
+              <a:t>06/12/2023</a:t>
             </a:fld>
             <a:endParaRPr lang="en-GB"/>
           </a:p>
@@ -1426,7 +1426,7 @@
           <a:p>
             <a:fld id="{39F74F40-967F-46B7-9595-DA9C60B09F55}" type="datetimeFigureOut">
               <a:rPr lang="en-GB" smtClean="0"/>
-              <a:t>06/11/2023</a:t>
+              <a:t>06/12/2023</a:t>
             </a:fld>
             <a:endParaRPr lang="en-GB"/>
           </a:p>
@@ -1838,7 +1838,7 @@
           <a:p>
             <a:fld id="{39F74F40-967F-46B7-9595-DA9C60B09F55}" type="datetimeFigureOut">
               <a:rPr lang="en-GB" smtClean="0"/>
-              <a:t>06/11/2023</a:t>
+              <a:t>06/12/2023</a:t>
             </a:fld>
             <a:endParaRPr lang="en-GB"/>
           </a:p>
@@ -1979,7 +1979,7 @@
           <a:p>
             <a:fld id="{39F74F40-967F-46B7-9595-DA9C60B09F55}" type="datetimeFigureOut">
               <a:rPr lang="en-GB" smtClean="0"/>
-              <a:t>06/11/2023</a:t>
+              <a:t>06/12/2023</a:t>
             </a:fld>
             <a:endParaRPr lang="en-GB"/>
           </a:p>
@@ -2092,7 +2092,7 @@
           <a:p>
             <a:fld id="{39F74F40-967F-46B7-9595-DA9C60B09F55}" type="datetimeFigureOut">
               <a:rPr lang="en-GB" smtClean="0"/>
-              <a:t>06/11/2023</a:t>
+              <a:t>06/12/2023</a:t>
             </a:fld>
             <a:endParaRPr lang="en-GB"/>
           </a:p>
@@ -2403,7 +2403,7 @@
           <a:p>
             <a:fld id="{39F74F40-967F-46B7-9595-DA9C60B09F55}" type="datetimeFigureOut">
               <a:rPr lang="en-GB" smtClean="0"/>
-              <a:t>06/11/2023</a:t>
+              <a:t>06/12/2023</a:t>
             </a:fld>
             <a:endParaRPr lang="en-GB"/>
           </a:p>
@@ -2691,7 +2691,7 @@
           <a:p>
             <a:fld id="{39F74F40-967F-46B7-9595-DA9C60B09F55}" type="datetimeFigureOut">
               <a:rPr lang="en-GB" smtClean="0"/>
-              <a:t>06/11/2023</a:t>
+              <a:t>06/12/2023</a:t>
             </a:fld>
             <a:endParaRPr lang="en-GB"/>
           </a:p>
@@ -2932,7 +2932,7 @@
           <a:p>
             <a:fld id="{39F74F40-967F-46B7-9595-DA9C60B09F55}" type="datetimeFigureOut">
               <a:rPr lang="en-GB" smtClean="0"/>
-              <a:t>06/11/2023</a:t>
+              <a:t>06/12/2023</a:t>
             </a:fld>
             <a:endParaRPr lang="en-GB"/>
           </a:p>

</xml_diff>